<commit_message>
Added quick quiz to viz-01
</commit_message>
<xml_diff>
--- a/data-viz-01/src/v01-main-scatterplots.pptx
+++ b/data-viz-01/src/v01-main-scatterplots.pptx
@@ -5,7 +5,7 @@
     <p:sldMasterId id="2147483648" r:id="rId1"/>
   </p:sldMasterIdLst>
   <p:notesMasterIdLst>
-    <p:NotesMasterId r:id="rId51"/>
+    <p:NotesMasterId r:id="rId55"/>
   </p:notesMasterIdLst>
   <p:sldIdLst>
     <p:sldId id="256" r:id="rId2"/>
@@ -57,6 +57,10 @@
     <p:sldId id="302" r:id="rId48"/>
     <p:sldId id="303" r:id="rId49"/>
     <p:sldId id="304" r:id="rId50"/>
+    <p:sldId id="305" r:id="rId51"/>
+    <p:sldId id="306" r:id="rId52"/>
+    <p:sldId id="307" r:id="rId53"/>
+    <p:sldId id="308" r:id="rId54"/>
   </p:sldIdLst>
   <p:sldSz cx="9144000" cy="6858000" type="screen4x3"/>
   <p:notesSz cx="6858000" cy="9144000"/>
@@ -38280,15 +38284,39 @@
             </a:pPr>
             <a:r>
               <a:rPr/>
-              <a:t>Advanced</a:t>
-            </a:r>
-            <a:r>
-              <a:rPr/>
-              <a:t> </a:t>
-            </a:r>
-            <a:r>
-              <a:rPr/>
-              <a:t>exercise</a:t>
+              <a:t>Quick</a:t>
+            </a:r>
+            <a:r>
+              <a:rPr/>
+              <a:t> </a:t>
+            </a:r>
+            <a:r>
+              <a:rPr/>
+              <a:t>quiz</a:t>
+            </a:r>
+            <a:r>
+              <a:rPr/>
+              <a:t> </a:t>
+            </a:r>
+            <a:r>
+              <a:rPr/>
+              <a:t>(1</a:t>
+            </a:r>
+            <a:r>
+              <a:rPr/>
+              <a:t> </a:t>
+            </a:r>
+            <a:r>
+              <a:rPr/>
+              <a:t>of</a:t>
+            </a:r>
+            <a:r>
+              <a:rPr/>
+              <a:t> </a:t>
+            </a:r>
+            <a:r>
+              <a:rPr/>
+              <a:t>4)</a:t>
             </a:r>
           </a:p>
         </p:txBody>
@@ -38308,35 +38336,12 @@
           <a:bodyPr/>
           <a:lstStyle/>
           <a:p>
-            <a:pPr lvl="1"/>
-            <a:r>
-              <a:rPr/>
-              <a:t>There is a second data set on sleep in mammals. You can find a brief description of this data set at</a:t>
-            </a:r>
-          </a:p>
-          <a:p>
-            <a:pPr lvl="2"/>
-            <a:r>
-              <a:rPr>
-                <a:hlinkClick r:id="rId2"/>
-              </a:rPr>
-              <a:t>http://www.statsci.org/data/general/sleep.html</a:t>
-            </a:r>
-          </a:p>
-          <a:p>
-            <a:pPr lvl="1"/>
-            <a:r>
-              <a:rPr/>
-              <a:t>You can download the actual data at</a:t>
-            </a:r>
-          </a:p>
-          <a:p>
-            <a:pPr lvl="2"/>
-            <a:r>
-              <a:rPr>
-                <a:hlinkClick r:id="rId3"/>
-              </a:rPr>
-              <a:t>http://www.statsci.org/data/general/sleep.txt</a:t>
+            <a:pPr lvl="0" marL="0" indent="0">
+              <a:buNone/>
+            </a:pPr>
+            <a:r>
+              <a:rPr/>
+              <a:t>Data visualization is a mapping of data to the visual aesthetics of geometries/marks. Some examples of visual aesthetics include (choose all that apply) 1. Size 2. Points 3. Shapes</a:t>
             </a:r>
           </a:p>
         </p:txBody>
@@ -38383,15 +38388,39 @@
             </a:pPr>
             <a:r>
               <a:rPr/>
-              <a:t>Advanced</a:t>
-            </a:r>
-            <a:r>
-              <a:rPr/>
-              <a:t> </a:t>
-            </a:r>
-            <a:r>
-              <a:rPr/>
-              <a:t>exercise</a:t>
+              <a:t>Quick</a:t>
+            </a:r>
+            <a:r>
+              <a:rPr/>
+              <a:t> </a:t>
+            </a:r>
+            <a:r>
+              <a:rPr/>
+              <a:t>quiz</a:t>
+            </a:r>
+            <a:r>
+              <a:rPr/>
+              <a:t> </a:t>
+            </a:r>
+            <a:r>
+              <a:rPr/>
+              <a:t>(2</a:t>
+            </a:r>
+            <a:r>
+              <a:rPr/>
+              <a:t> </a:t>
+            </a:r>
+            <a:r>
+              <a:rPr/>
+              <a:t>of</a:t>
+            </a:r>
+            <a:r>
+              <a:rPr/>
+              <a:t> </a:t>
+            </a:r>
+            <a:r>
+              <a:rPr/>
+              <a:t>4)</a:t>
             </a:r>
           </a:p>
         </p:txBody>
@@ -38411,45 +38440,12 @@
           <a:bodyPr/>
           <a:lstStyle/>
           <a:p>
-            <a:pPr lvl="1"/>
-            <a:r>
-              <a:rPr/>
-              <a:t>Draw a visualization that illustrates the interrelationships among</a:t>
-            </a:r>
-          </a:p>
-          <a:p>
-            <a:pPr lvl="2"/>
-            <a:r>
-              <a:rPr/>
-              <a:t>bodywt, lifespan, gestation</a:t>
-            </a:r>
-          </a:p>
-          <a:p>
-            <a:pPr lvl="2"/>
-            <a:r>
-              <a:rPr/>
-              <a:t>bodywt, brainwt, and totalsleep</a:t>
-            </a:r>
-          </a:p>
-          <a:p>
-            <a:pPr lvl="2"/>
-            <a:r>
-              <a:rPr/>
-              <a:t>predation, exposure, and totalsleep</a:t>
-            </a:r>
-          </a:p>
-          <a:p>
-            <a:pPr lvl="2"/>
-            <a:r>
-              <a:rPr/>
-              <a:t>bodywt, predation, and lifespan</a:t>
-            </a:r>
-          </a:p>
-          <a:p>
-            <a:pPr lvl="1"/>
-            <a:r>
-              <a:rPr/>
-              <a:t>Divide the work among different group members</a:t>
+            <a:pPr lvl="0" marL="0" indent="0">
+              <a:buNone/>
+            </a:pPr>
+            <a:r>
+              <a:rPr/>
+              <a:t>The log transformation works by (choose the best answer) 1. Stretching all data values equally. 2. Stretching the small values and squeezing the large values. 3. Stretching the large values and squeezing the small values.</a:t>
             </a:r>
           </a:p>
         </p:txBody>
@@ -38496,7 +38492,39 @@
             </a:pPr>
             <a:r>
               <a:rPr/>
-              <a:t>Summary</a:t>
+              <a:t>Quick</a:t>
+            </a:r>
+            <a:r>
+              <a:rPr/>
+              <a:t> </a:t>
+            </a:r>
+            <a:r>
+              <a:rPr/>
+              <a:t>quiz</a:t>
+            </a:r>
+            <a:r>
+              <a:rPr/>
+              <a:t> </a:t>
+            </a:r>
+            <a:r>
+              <a:rPr/>
+              <a:t>(3</a:t>
+            </a:r>
+            <a:r>
+              <a:rPr/>
+              <a:t> </a:t>
+            </a:r>
+            <a:r>
+              <a:rPr/>
+              <a:t>of</a:t>
+            </a:r>
+            <a:r>
+              <a:rPr/>
+              <a:t> </a:t>
+            </a:r>
+            <a:r>
+              <a:rPr/>
+              <a:t>4)</a:t>
             </a:r>
           </a:p>
         </p:txBody>
@@ -38516,59 +38544,12 @@
           <a:bodyPr/>
           <a:lstStyle/>
           <a:p>
-            <a:pPr lvl="1"/>
-            <a:r>
-              <a:rPr/>
-              <a:t>“A mapping of data to the visual aesthetics of geometries/marks”</a:t>
-            </a:r>
-          </a:p>
-          <a:p>
-            <a:pPr lvl="2"/>
-            <a:r>
-              <a:rPr/>
-              <a:t>Points are a type of geometry/mark</a:t>
-            </a:r>
-          </a:p>
-          <a:p>
-            <a:pPr lvl="2"/>
-            <a:r>
-              <a:rPr/>
-              <a:t>Aesthetics for points include location, shape, size, color</a:t>
-            </a:r>
-          </a:p>
-          <a:p>
-            <a:pPr lvl="1"/>
-            <a:r>
-              <a:rPr/>
-              <a:t>Basic tips</a:t>
-            </a:r>
-          </a:p>
-          <a:p>
-            <a:pPr lvl="2"/>
-            <a:r>
-              <a:rPr/>
-              <a:t>Don’t try to squeeze in too much</a:t>
-            </a:r>
-          </a:p>
-          <a:p>
-            <a:pPr lvl="2"/>
-            <a:r>
-              <a:rPr/>
-              <a:t>Double up to emphasize</a:t>
-            </a:r>
-          </a:p>
-          <a:p>
-            <a:pPr lvl="2"/>
-            <a:r>
-              <a:rPr/>
-              <a:t>Shape is only good for categories</a:t>
-            </a:r>
-          </a:p>
-          <a:p>
-            <a:pPr lvl="2"/>
-            <a:r>
-              <a:rPr/>
-              <a:t>Shape and size don’t mix</a:t>
+            <a:pPr lvl="0" marL="0" indent="0">
+              <a:buNone/>
+            </a:pPr>
+            <a:r>
+              <a:rPr/>
+              <a:t>Strategies that can sometimes help when you have a lot of problems with overprinting include (choose all that apply) 1. Using open circles 2. Using large size points 3. Using translucent points</a:t>
             </a:r>
           </a:p>
         </p:txBody>
@@ -38713,6 +38694,445 @@
             <a:r>
               <a:rPr/>
               <a:t>Don’t bother with changing any of the default options</a:t>
+            </a:r>
+          </a:p>
+        </p:txBody>
+      </p:sp>
+    </p:spTree>
+  </p:cSld>
+</p:sld>
+</file>
+
+<file path=ppt/slides/slide50.xml><?xml version="1.0" encoding="utf-8"?>
+<p:sld xmlns:a="http://schemas.openxmlformats.org/drawingml/2006/main" xmlns:r="http://schemas.openxmlformats.org/officeDocument/2006/relationships" xmlns:p="http://schemas.openxmlformats.org/presentationml/2006/main">
+  <p:cSld>
+    <p:spTree>
+      <p:nvGrpSpPr>
+        <p:cNvPr id="1" name=""/>
+        <p:cNvGrpSpPr/>
+        <p:nvPr/>
+      </p:nvGrpSpPr>
+      <p:grpSpPr>
+        <a:xfrm>
+          <a:off x="0" y="0"/>
+          <a:ext cx="0" cy="0"/>
+          <a:chOff x="0" y="0"/>
+          <a:chExt cx="0" cy="0"/>
+        </a:xfrm>
+      </p:grpSpPr>
+      <p:sp>
+        <p:nvSpPr>
+          <p:cNvPr id="2" name="Title 1"/>
+          <p:cNvSpPr>
+            <a:spLocks noGrp="1"/>
+          </p:cNvSpPr>
+          <p:nvPr>
+            <p:ph type="title"/>
+          </p:nvPr>
+        </p:nvSpPr>
+        <p:spPr/>
+        <p:txBody>
+          <a:bodyPr/>
+          <a:lstStyle/>
+          <a:p>
+            <a:pPr lvl="0" marL="0" indent="0">
+              <a:buNone/>
+            </a:pPr>
+            <a:r>
+              <a:rPr/>
+              <a:t>Quick</a:t>
+            </a:r>
+            <a:r>
+              <a:rPr/>
+              <a:t> </a:t>
+            </a:r>
+            <a:r>
+              <a:rPr/>
+              <a:t>quiz</a:t>
+            </a:r>
+            <a:r>
+              <a:rPr/>
+              <a:t> </a:t>
+            </a:r>
+            <a:r>
+              <a:rPr/>
+              <a:t>(4</a:t>
+            </a:r>
+            <a:r>
+              <a:rPr/>
+              <a:t> </a:t>
+            </a:r>
+            <a:r>
+              <a:rPr/>
+              <a:t>of</a:t>
+            </a:r>
+            <a:r>
+              <a:rPr/>
+              <a:t> </a:t>
+            </a:r>
+            <a:r>
+              <a:rPr/>
+              <a:t>4)</a:t>
+            </a:r>
+          </a:p>
+        </p:txBody>
+      </p:sp>
+      <p:sp>
+        <p:nvSpPr>
+          <p:cNvPr id="3" name="Content Placeholder 2"/>
+          <p:cNvSpPr>
+            <a:spLocks noGrp="1"/>
+          </p:cNvSpPr>
+          <p:nvPr>
+            <p:ph idx="1"/>
+          </p:nvPr>
+        </p:nvSpPr>
+        <p:spPr/>
+        <p:txBody>
+          <a:bodyPr/>
+          <a:lstStyle/>
+          <a:p>
+            <a:pPr lvl="0" marL="0" indent="0">
+              <a:buNone/>
+            </a:pPr>
+            <a:r>
+              <a:rPr/>
+              <a:t>The two visual aesthetics that doen’t work well together are (choose the best answer) 1. color and size 2. color and shape 3. size and shape</a:t>
+            </a:r>
+          </a:p>
+        </p:txBody>
+      </p:sp>
+    </p:spTree>
+  </p:cSld>
+</p:sld>
+</file>
+
+<file path=ppt/slides/slide51.xml><?xml version="1.0" encoding="utf-8"?>
+<p:sld xmlns:a="http://schemas.openxmlformats.org/drawingml/2006/main" xmlns:r="http://schemas.openxmlformats.org/officeDocument/2006/relationships" xmlns:p="http://schemas.openxmlformats.org/presentationml/2006/main">
+  <p:cSld>
+    <p:spTree>
+      <p:nvGrpSpPr>
+        <p:cNvPr id="1" name=""/>
+        <p:cNvGrpSpPr/>
+        <p:nvPr/>
+      </p:nvGrpSpPr>
+      <p:grpSpPr>
+        <a:xfrm>
+          <a:off x="0" y="0"/>
+          <a:ext cx="0" cy="0"/>
+          <a:chOff x="0" y="0"/>
+          <a:chExt cx="0" cy="0"/>
+        </a:xfrm>
+      </p:grpSpPr>
+      <p:sp>
+        <p:nvSpPr>
+          <p:cNvPr id="2" name="Title 1"/>
+          <p:cNvSpPr>
+            <a:spLocks noGrp="1"/>
+          </p:cNvSpPr>
+          <p:nvPr>
+            <p:ph type="title"/>
+          </p:nvPr>
+        </p:nvSpPr>
+        <p:spPr/>
+        <p:txBody>
+          <a:bodyPr/>
+          <a:lstStyle/>
+          <a:p>
+            <a:pPr lvl="0" marL="0" indent="0">
+              <a:buNone/>
+            </a:pPr>
+            <a:r>
+              <a:rPr/>
+              <a:t>Advanced</a:t>
+            </a:r>
+            <a:r>
+              <a:rPr/>
+              <a:t> </a:t>
+            </a:r>
+            <a:r>
+              <a:rPr/>
+              <a:t>exercise</a:t>
+            </a:r>
+          </a:p>
+        </p:txBody>
+      </p:sp>
+      <p:sp>
+        <p:nvSpPr>
+          <p:cNvPr id="3" name="Content Placeholder 2"/>
+          <p:cNvSpPr>
+            <a:spLocks noGrp="1"/>
+          </p:cNvSpPr>
+          <p:nvPr>
+            <p:ph idx="1"/>
+          </p:nvPr>
+        </p:nvSpPr>
+        <p:spPr/>
+        <p:txBody>
+          <a:bodyPr/>
+          <a:lstStyle/>
+          <a:p>
+            <a:pPr lvl="1"/>
+            <a:r>
+              <a:rPr/>
+              <a:t>There is a second data set on sleep in mammals. You can find a brief description of this data set at</a:t>
+            </a:r>
+          </a:p>
+          <a:p>
+            <a:pPr lvl="2"/>
+            <a:r>
+              <a:rPr>
+                <a:hlinkClick r:id="rId2"/>
+              </a:rPr>
+              <a:t>http://www.statsci.org/data/general/sleep.html</a:t>
+            </a:r>
+          </a:p>
+          <a:p>
+            <a:pPr lvl="1"/>
+            <a:r>
+              <a:rPr/>
+              <a:t>You can download the actual data at</a:t>
+            </a:r>
+          </a:p>
+          <a:p>
+            <a:pPr lvl="2"/>
+            <a:r>
+              <a:rPr>
+                <a:hlinkClick r:id="rId3"/>
+              </a:rPr>
+              <a:t>http://www.statsci.org/data/general/sleep.txt</a:t>
+            </a:r>
+          </a:p>
+        </p:txBody>
+      </p:sp>
+    </p:spTree>
+  </p:cSld>
+</p:sld>
+</file>
+
+<file path=ppt/slides/slide52.xml><?xml version="1.0" encoding="utf-8"?>
+<p:sld xmlns:a="http://schemas.openxmlformats.org/drawingml/2006/main" xmlns:r="http://schemas.openxmlformats.org/officeDocument/2006/relationships" xmlns:p="http://schemas.openxmlformats.org/presentationml/2006/main">
+  <p:cSld>
+    <p:spTree>
+      <p:nvGrpSpPr>
+        <p:cNvPr id="1" name=""/>
+        <p:cNvGrpSpPr/>
+        <p:nvPr/>
+      </p:nvGrpSpPr>
+      <p:grpSpPr>
+        <a:xfrm>
+          <a:off x="0" y="0"/>
+          <a:ext cx="0" cy="0"/>
+          <a:chOff x="0" y="0"/>
+          <a:chExt cx="0" cy="0"/>
+        </a:xfrm>
+      </p:grpSpPr>
+      <p:sp>
+        <p:nvSpPr>
+          <p:cNvPr id="2" name="Title 1"/>
+          <p:cNvSpPr>
+            <a:spLocks noGrp="1"/>
+          </p:cNvSpPr>
+          <p:nvPr>
+            <p:ph type="title"/>
+          </p:nvPr>
+        </p:nvSpPr>
+        <p:spPr/>
+        <p:txBody>
+          <a:bodyPr/>
+          <a:lstStyle/>
+          <a:p>
+            <a:pPr lvl="0" marL="0" indent="0">
+              <a:buNone/>
+            </a:pPr>
+            <a:r>
+              <a:rPr/>
+              <a:t>Advanced</a:t>
+            </a:r>
+            <a:r>
+              <a:rPr/>
+              <a:t> </a:t>
+            </a:r>
+            <a:r>
+              <a:rPr/>
+              <a:t>exercise</a:t>
+            </a:r>
+          </a:p>
+        </p:txBody>
+      </p:sp>
+      <p:sp>
+        <p:nvSpPr>
+          <p:cNvPr id="3" name="Content Placeholder 2"/>
+          <p:cNvSpPr>
+            <a:spLocks noGrp="1"/>
+          </p:cNvSpPr>
+          <p:nvPr>
+            <p:ph idx="1"/>
+          </p:nvPr>
+        </p:nvSpPr>
+        <p:spPr/>
+        <p:txBody>
+          <a:bodyPr/>
+          <a:lstStyle/>
+          <a:p>
+            <a:pPr lvl="1"/>
+            <a:r>
+              <a:rPr/>
+              <a:t>Draw a visualization that illustrates the interrelationships among</a:t>
+            </a:r>
+          </a:p>
+          <a:p>
+            <a:pPr lvl="2"/>
+            <a:r>
+              <a:rPr/>
+              <a:t>bodywt, lifespan, gestation</a:t>
+            </a:r>
+          </a:p>
+          <a:p>
+            <a:pPr lvl="2"/>
+            <a:r>
+              <a:rPr/>
+              <a:t>bodywt, brainwt, and totalsleep</a:t>
+            </a:r>
+          </a:p>
+          <a:p>
+            <a:pPr lvl="2"/>
+            <a:r>
+              <a:rPr/>
+              <a:t>predation, exposure, and totalsleep</a:t>
+            </a:r>
+          </a:p>
+          <a:p>
+            <a:pPr lvl="2"/>
+            <a:r>
+              <a:rPr/>
+              <a:t>bodywt, predation, and lifespan</a:t>
+            </a:r>
+          </a:p>
+          <a:p>
+            <a:pPr lvl="1"/>
+            <a:r>
+              <a:rPr/>
+              <a:t>Divide the work among different group members</a:t>
+            </a:r>
+          </a:p>
+        </p:txBody>
+      </p:sp>
+    </p:spTree>
+  </p:cSld>
+</p:sld>
+</file>
+
+<file path=ppt/slides/slide53.xml><?xml version="1.0" encoding="utf-8"?>
+<p:sld xmlns:a="http://schemas.openxmlformats.org/drawingml/2006/main" xmlns:r="http://schemas.openxmlformats.org/officeDocument/2006/relationships" xmlns:p="http://schemas.openxmlformats.org/presentationml/2006/main">
+  <p:cSld>
+    <p:spTree>
+      <p:nvGrpSpPr>
+        <p:cNvPr id="1" name=""/>
+        <p:cNvGrpSpPr/>
+        <p:nvPr/>
+      </p:nvGrpSpPr>
+      <p:grpSpPr>
+        <a:xfrm>
+          <a:off x="0" y="0"/>
+          <a:ext cx="0" cy="0"/>
+          <a:chOff x="0" y="0"/>
+          <a:chExt cx="0" cy="0"/>
+        </a:xfrm>
+      </p:grpSpPr>
+      <p:sp>
+        <p:nvSpPr>
+          <p:cNvPr id="2" name="Title 1"/>
+          <p:cNvSpPr>
+            <a:spLocks noGrp="1"/>
+          </p:cNvSpPr>
+          <p:nvPr>
+            <p:ph type="title"/>
+          </p:nvPr>
+        </p:nvSpPr>
+        <p:spPr/>
+        <p:txBody>
+          <a:bodyPr/>
+          <a:lstStyle/>
+          <a:p>
+            <a:pPr lvl="0" marL="0" indent="0">
+              <a:buNone/>
+            </a:pPr>
+            <a:r>
+              <a:rPr/>
+              <a:t>Summary</a:t>
+            </a:r>
+          </a:p>
+        </p:txBody>
+      </p:sp>
+      <p:sp>
+        <p:nvSpPr>
+          <p:cNvPr id="3" name="Content Placeholder 2"/>
+          <p:cNvSpPr>
+            <a:spLocks noGrp="1"/>
+          </p:cNvSpPr>
+          <p:nvPr>
+            <p:ph idx="1"/>
+          </p:nvPr>
+        </p:nvSpPr>
+        <p:spPr/>
+        <p:txBody>
+          <a:bodyPr/>
+          <a:lstStyle/>
+          <a:p>
+            <a:pPr lvl="1"/>
+            <a:r>
+              <a:rPr/>
+              <a:t>“A mapping of data to the visual aesthetics of geometries/marks”</a:t>
+            </a:r>
+          </a:p>
+          <a:p>
+            <a:pPr lvl="2"/>
+            <a:r>
+              <a:rPr/>
+              <a:t>Points are a type of geometry/mark</a:t>
+            </a:r>
+          </a:p>
+          <a:p>
+            <a:pPr lvl="2"/>
+            <a:r>
+              <a:rPr/>
+              <a:t>Aesthetics for points include location, shape, size, color</a:t>
+            </a:r>
+          </a:p>
+          <a:p>
+            <a:pPr lvl="1"/>
+            <a:r>
+              <a:rPr/>
+              <a:t>Basic tips</a:t>
+            </a:r>
+          </a:p>
+          <a:p>
+            <a:pPr lvl="2"/>
+            <a:r>
+              <a:rPr/>
+              <a:t>Don’t try to squeeze in too much</a:t>
+            </a:r>
+          </a:p>
+          <a:p>
+            <a:pPr lvl="2"/>
+            <a:r>
+              <a:rPr/>
+              <a:t>Double up to emphasize</a:t>
+            </a:r>
+          </a:p>
+          <a:p>
+            <a:pPr lvl="2"/>
+            <a:r>
+              <a:rPr/>
+              <a:t>Shape is only good for categories</a:t>
+            </a:r>
+          </a:p>
+          <a:p>
+            <a:pPr lvl="2"/>
+            <a:r>
+              <a:rPr/>
+              <a:t>Shape and size don’t mix</a:t>
             </a:r>
           </a:p>
         </p:txBody>

</xml_diff>